<commit_message>
Passei algumas imagens de jpg pra pdf
</commit_message>
<xml_diff>
--- a/docs/arquiteturaGeral.pptx
+++ b/docs/arquiteturaGeral.pptx
@@ -292,7 +292,7 @@
             <a:fld id="{E0C22920-CB56-44C8-BF7E-02BC875F8FF4}" type="datetimeFigureOut">
               <a:rPr lang="pt-BR" smtClean="0"/>
               <a:pPr/>
-              <a:t>20/12/2009</a:t>
+              <a:t>21/12/2009</a:t>
             </a:fld>
             <a:endParaRPr lang="pt-BR"/>
           </a:p>
@@ -459,7 +459,7 @@
             <a:fld id="{E0C22920-CB56-44C8-BF7E-02BC875F8FF4}" type="datetimeFigureOut">
               <a:rPr lang="pt-BR" smtClean="0"/>
               <a:pPr/>
-              <a:t>20/12/2009</a:t>
+              <a:t>21/12/2009</a:t>
             </a:fld>
             <a:endParaRPr lang="pt-BR"/>
           </a:p>
@@ -636,7 +636,7 @@
             <a:fld id="{E0C22920-CB56-44C8-BF7E-02BC875F8FF4}" type="datetimeFigureOut">
               <a:rPr lang="pt-BR" smtClean="0"/>
               <a:pPr/>
-              <a:t>20/12/2009</a:t>
+              <a:t>21/12/2009</a:t>
             </a:fld>
             <a:endParaRPr lang="pt-BR"/>
           </a:p>
@@ -803,7 +803,7 @@
             <a:fld id="{E0C22920-CB56-44C8-BF7E-02BC875F8FF4}" type="datetimeFigureOut">
               <a:rPr lang="pt-BR" smtClean="0"/>
               <a:pPr/>
-              <a:t>20/12/2009</a:t>
+              <a:t>21/12/2009</a:t>
             </a:fld>
             <a:endParaRPr lang="pt-BR"/>
           </a:p>
@@ -1046,7 +1046,7 @@
             <a:fld id="{E0C22920-CB56-44C8-BF7E-02BC875F8FF4}" type="datetimeFigureOut">
               <a:rPr lang="pt-BR" smtClean="0"/>
               <a:pPr/>
-              <a:t>20/12/2009</a:t>
+              <a:t>21/12/2009</a:t>
             </a:fld>
             <a:endParaRPr lang="pt-BR"/>
           </a:p>
@@ -1331,7 +1331,7 @@
             <a:fld id="{E0C22920-CB56-44C8-BF7E-02BC875F8FF4}" type="datetimeFigureOut">
               <a:rPr lang="pt-BR" smtClean="0"/>
               <a:pPr/>
-              <a:t>20/12/2009</a:t>
+              <a:t>21/12/2009</a:t>
             </a:fld>
             <a:endParaRPr lang="pt-BR"/>
           </a:p>
@@ -1750,7 +1750,7 @@
             <a:fld id="{E0C22920-CB56-44C8-BF7E-02BC875F8FF4}" type="datetimeFigureOut">
               <a:rPr lang="pt-BR" smtClean="0"/>
               <a:pPr/>
-              <a:t>20/12/2009</a:t>
+              <a:t>21/12/2009</a:t>
             </a:fld>
             <a:endParaRPr lang="pt-BR"/>
           </a:p>
@@ -1865,7 +1865,7 @@
             <a:fld id="{E0C22920-CB56-44C8-BF7E-02BC875F8FF4}" type="datetimeFigureOut">
               <a:rPr lang="pt-BR" smtClean="0"/>
               <a:pPr/>
-              <a:t>20/12/2009</a:t>
+              <a:t>21/12/2009</a:t>
             </a:fld>
             <a:endParaRPr lang="pt-BR"/>
           </a:p>
@@ -1957,7 +1957,7 @@
             <a:fld id="{E0C22920-CB56-44C8-BF7E-02BC875F8FF4}" type="datetimeFigureOut">
               <a:rPr lang="pt-BR" smtClean="0"/>
               <a:pPr/>
-              <a:t>20/12/2009</a:t>
+              <a:t>21/12/2009</a:t>
             </a:fld>
             <a:endParaRPr lang="pt-BR"/>
           </a:p>
@@ -2231,7 +2231,7 @@
             <a:fld id="{E0C22920-CB56-44C8-BF7E-02BC875F8FF4}" type="datetimeFigureOut">
               <a:rPr lang="pt-BR" smtClean="0"/>
               <a:pPr/>
-              <a:t>20/12/2009</a:t>
+              <a:t>21/12/2009</a:t>
             </a:fld>
             <a:endParaRPr lang="pt-BR"/>
           </a:p>
@@ -2481,7 +2481,7 @@
             <a:fld id="{E0C22920-CB56-44C8-BF7E-02BC875F8FF4}" type="datetimeFigureOut">
               <a:rPr lang="pt-BR" smtClean="0"/>
               <a:pPr/>
-              <a:t>20/12/2009</a:t>
+              <a:t>21/12/2009</a:t>
             </a:fld>
             <a:endParaRPr lang="pt-BR"/>
           </a:p>
@@ -2691,7 +2691,7 @@
             <a:fld id="{E0C22920-CB56-44C8-BF7E-02BC875F8FF4}" type="datetimeFigureOut">
               <a:rPr lang="pt-BR" smtClean="0"/>
               <a:pPr/>
-              <a:t>20/12/2009</a:t>
+              <a:t>21/12/2009</a:t>
             </a:fld>
             <a:endParaRPr lang="pt-BR"/>
           </a:p>
@@ -3076,9 +3076,12 @@
           <a:prstGeom prst="rect">
             <a:avLst/>
           </a:prstGeom>
-          <a:solidFill>
-            <a:schemeClr val="bg1"/>
-          </a:solidFill>
+          <a:noFill/>
+          <a:ln>
+            <a:solidFill>
+              <a:schemeClr val="tx1"/>
+            </a:solidFill>
+          </a:ln>
         </p:spPr>
         <p:style>
           <a:lnRef idx="2">
@@ -3102,16 +3105,16 @@
           <a:p>
             <a:pPr algn="ctr"/>
             <a:r>
-              <a:rPr lang="pt-BR" dirty="0" smtClean="0">
+              <a:rPr lang="pt-BR" i="1" dirty="0" smtClean="0">
                 <a:solidFill>
-                  <a:schemeClr val="accent1"/>
+                  <a:schemeClr val="tx1"/>
                 </a:solidFill>
               </a:rPr>
               <a:t>Sensores</a:t>
             </a:r>
-            <a:endParaRPr lang="pt-BR" dirty="0">
+            <a:endParaRPr lang="pt-BR" i="1" dirty="0">
               <a:solidFill>
-                <a:schemeClr val="accent1"/>
+                <a:schemeClr val="tx1"/>
               </a:solidFill>
             </a:endParaRPr>
           </a:p>
@@ -3131,9 +3134,12 @@
           <a:prstGeom prst="rect">
             <a:avLst/>
           </a:prstGeom>
-          <a:solidFill>
-            <a:schemeClr val="bg1"/>
-          </a:solidFill>
+          <a:noFill/>
+          <a:ln>
+            <a:solidFill>
+              <a:schemeClr val="tx1"/>
+            </a:solidFill>
+          </a:ln>
         </p:spPr>
         <p:style>
           <a:lnRef idx="2">
@@ -3157,16 +3163,16 @@
           <a:p>
             <a:pPr algn="ctr"/>
             <a:r>
-              <a:rPr lang="pt-BR" dirty="0" smtClean="0">
+              <a:rPr lang="pt-BR" i="1" dirty="0" smtClean="0">
                 <a:solidFill>
-                  <a:schemeClr val="accent1"/>
+                  <a:schemeClr val="tx1"/>
                 </a:solidFill>
               </a:rPr>
               <a:t>Navegação</a:t>
             </a:r>
-            <a:endParaRPr lang="pt-BR" dirty="0">
+            <a:endParaRPr lang="pt-BR" i="1" dirty="0">
               <a:solidFill>
-                <a:schemeClr val="accent1"/>
+                <a:schemeClr val="tx1"/>
               </a:solidFill>
             </a:endParaRPr>
           </a:p>
@@ -3186,6 +3192,12 @@
           <a:prstGeom prst="rect">
             <a:avLst/>
           </a:prstGeom>
+          <a:noFill/>
+          <a:ln>
+            <a:solidFill>
+              <a:schemeClr val="tx1"/>
+            </a:solidFill>
+          </a:ln>
         </p:spPr>
         <p:style>
           <a:lnRef idx="2">
@@ -3209,10 +3221,18 @@
           <a:p>
             <a:pPr algn="ctr"/>
             <a:r>
-              <a:rPr lang="pt-BR" dirty="0" smtClean="0"/>
+              <a:rPr lang="pt-BR" dirty="0" smtClean="0">
+                <a:solidFill>
+                  <a:schemeClr val="tx1"/>
+                </a:solidFill>
+              </a:rPr>
               <a:t>Interface Gráfica</a:t>
             </a:r>
-            <a:endParaRPr lang="pt-BR" dirty="0"/>
+            <a:endParaRPr lang="pt-BR" dirty="0">
+              <a:solidFill>
+                <a:schemeClr val="tx1"/>
+              </a:solidFill>
+            </a:endParaRPr>
           </a:p>
         </p:txBody>
       </p:sp>
@@ -3230,6 +3250,12 @@
           <a:prstGeom prst="rect">
             <a:avLst/>
           </a:prstGeom>
+          <a:noFill/>
+          <a:ln>
+            <a:solidFill>
+              <a:schemeClr val="tx1"/>
+            </a:solidFill>
+          </a:ln>
         </p:spPr>
         <p:style>
           <a:lnRef idx="2">
@@ -3253,10 +3279,18 @@
           <a:p>
             <a:pPr algn="ctr"/>
             <a:r>
-              <a:rPr lang="pt-BR" dirty="0" smtClean="0"/>
+              <a:rPr lang="pt-BR" dirty="0" smtClean="0">
+                <a:solidFill>
+                  <a:schemeClr val="tx1"/>
+                </a:solidFill>
+              </a:rPr>
               <a:t>Planejamento</a:t>
             </a:r>
-            <a:endParaRPr lang="pt-BR" dirty="0"/>
+            <a:endParaRPr lang="pt-BR" dirty="0">
+              <a:solidFill>
+                <a:schemeClr val="tx1"/>
+              </a:solidFill>
+            </a:endParaRPr>
           </a:p>
         </p:txBody>
       </p:sp>
@@ -3274,6 +3308,12 @@
           <a:prstGeom prst="rect">
             <a:avLst/>
           </a:prstGeom>
+          <a:noFill/>
+          <a:ln>
+            <a:solidFill>
+              <a:schemeClr val="tx1"/>
+            </a:solidFill>
+          </a:ln>
         </p:spPr>
         <p:style>
           <a:lnRef idx="2">
@@ -3297,10 +3337,18 @@
           <a:p>
             <a:pPr algn="ctr"/>
             <a:r>
-              <a:rPr lang="pt-BR" dirty="0" smtClean="0"/>
+              <a:rPr lang="pt-BR" dirty="0" smtClean="0">
+                <a:solidFill>
+                  <a:schemeClr val="tx1"/>
+                </a:solidFill>
+              </a:rPr>
               <a:t>Execução</a:t>
             </a:r>
-            <a:endParaRPr lang="pt-BR" dirty="0"/>
+            <a:endParaRPr lang="pt-BR" dirty="0">
+              <a:solidFill>
+                <a:schemeClr val="tx1"/>
+              </a:solidFill>
+            </a:endParaRPr>
           </a:p>
         </p:txBody>
       </p:sp>
@@ -3318,6 +3366,12 @@
           <a:prstGeom prst="rect">
             <a:avLst/>
           </a:prstGeom>
+          <a:noFill/>
+          <a:ln>
+            <a:solidFill>
+              <a:schemeClr val="tx1"/>
+            </a:solidFill>
+          </a:ln>
         </p:spPr>
         <p:style>
           <a:lnRef idx="2">
@@ -3341,10 +3395,18 @@
           <a:p>
             <a:pPr algn="ctr"/>
             <a:r>
-              <a:rPr lang="pt-BR" dirty="0" smtClean="0"/>
+              <a:rPr lang="pt-BR" dirty="0" smtClean="0">
+                <a:solidFill>
+                  <a:schemeClr val="tx1"/>
+                </a:solidFill>
+              </a:rPr>
               <a:t>Motores</a:t>
             </a:r>
-            <a:endParaRPr lang="pt-BR" dirty="0"/>
+            <a:endParaRPr lang="pt-BR" dirty="0">
+              <a:solidFill>
+                <a:schemeClr val="tx1"/>
+              </a:solidFill>
+            </a:endParaRPr>
           </a:p>
         </p:txBody>
       </p:sp>
@@ -3362,6 +3424,12 @@
           <a:prstGeom prst="rect">
             <a:avLst/>
           </a:prstGeom>
+          <a:noFill/>
+          <a:ln>
+            <a:solidFill>
+              <a:schemeClr val="tx1"/>
+            </a:solidFill>
+          </a:ln>
         </p:spPr>
         <p:style>
           <a:lnRef idx="2">
@@ -3385,10 +3453,18 @@
           <a:p>
             <a:pPr algn="ctr"/>
             <a:r>
-              <a:rPr lang="pt-BR" dirty="0" smtClean="0"/>
+              <a:rPr lang="pt-BR" dirty="0" smtClean="0">
+                <a:solidFill>
+                  <a:schemeClr val="tx1"/>
+                </a:solidFill>
+              </a:rPr>
               <a:t>Localização</a:t>
             </a:r>
-            <a:endParaRPr lang="pt-BR" dirty="0"/>
+            <a:endParaRPr lang="pt-BR" dirty="0">
+              <a:solidFill>
+                <a:schemeClr val="tx1"/>
+              </a:solidFill>
+            </a:endParaRPr>
           </a:p>
         </p:txBody>
       </p:sp>
@@ -3410,6 +3486,9 @@
             <a:avLst/>
           </a:prstGeom>
           <a:ln w="28575">
+            <a:solidFill>
+              <a:schemeClr val="tx1"/>
+            </a:solidFill>
             <a:tailEnd type="arrow"/>
           </a:ln>
         </p:spPr>
@@ -3446,6 +3525,9 @@
             <a:avLst/>
           </a:prstGeom>
           <a:ln w="28575">
+            <a:solidFill>
+              <a:schemeClr val="tx1"/>
+            </a:solidFill>
             <a:tailEnd type="arrow"/>
           </a:ln>
         </p:spPr>
@@ -3482,6 +3564,9 @@
             <a:avLst/>
           </a:prstGeom>
           <a:ln w="28575">
+            <a:solidFill>
+              <a:schemeClr val="tx1"/>
+            </a:solidFill>
             <a:tailEnd type="arrow"/>
           </a:ln>
         </p:spPr>
@@ -3517,6 +3602,9 @@
             <a:avLst/>
           </a:prstGeom>
           <a:ln w="28575">
+            <a:solidFill>
+              <a:schemeClr val="tx1"/>
+            </a:solidFill>
             <a:tailEnd type="arrow"/>
           </a:ln>
         </p:spPr>
@@ -3552,6 +3640,9 @@
             <a:avLst/>
           </a:prstGeom>
           <a:ln w="28575">
+            <a:solidFill>
+              <a:schemeClr val="tx1"/>
+            </a:solidFill>
             <a:tailEnd type="arrow"/>
           </a:ln>
         </p:spPr>
@@ -3588,6 +3679,9 @@
             <a:avLst/>
           </a:prstGeom>
           <a:ln w="28575">
+            <a:solidFill>
+              <a:schemeClr val="tx1"/>
+            </a:solidFill>
             <a:tailEnd type="arrow"/>
           </a:ln>
         </p:spPr>
@@ -3620,6 +3714,12 @@
           <a:prstGeom prst="rect">
             <a:avLst/>
           </a:prstGeom>
+          <a:noFill/>
+          <a:ln>
+            <a:solidFill>
+              <a:schemeClr val="tx1"/>
+            </a:solidFill>
+          </a:ln>
         </p:spPr>
         <p:style>
           <a:lnRef idx="2">
@@ -3643,10 +3743,18 @@
           <a:p>
             <a:pPr algn="ctr"/>
             <a:r>
-              <a:rPr lang="pt-BR" dirty="0" smtClean="0"/>
+              <a:rPr lang="pt-BR" dirty="0" smtClean="0">
+                <a:solidFill>
+                  <a:schemeClr val="tx1"/>
+                </a:solidFill>
+              </a:rPr>
               <a:t>Sonares</a:t>
             </a:r>
-            <a:endParaRPr lang="pt-BR" dirty="0"/>
+            <a:endParaRPr lang="pt-BR" dirty="0">
+              <a:solidFill>
+                <a:schemeClr val="tx1"/>
+              </a:solidFill>
+            </a:endParaRPr>
           </a:p>
         </p:txBody>
       </p:sp>
@@ -3664,6 +3772,12 @@
           <a:prstGeom prst="rect">
             <a:avLst/>
           </a:prstGeom>
+          <a:noFill/>
+          <a:ln>
+            <a:solidFill>
+              <a:schemeClr val="tx1"/>
+            </a:solidFill>
+          </a:ln>
         </p:spPr>
         <p:style>
           <a:lnRef idx="2">
@@ -3687,10 +3801,18 @@
           <a:p>
             <a:pPr algn="ctr"/>
             <a:r>
-              <a:rPr lang="pt-BR" dirty="0" smtClean="0"/>
+              <a:rPr lang="pt-BR" dirty="0" smtClean="0">
+                <a:solidFill>
+                  <a:schemeClr val="tx1"/>
+                </a:solidFill>
+              </a:rPr>
               <a:t>Odômetro</a:t>
             </a:r>
-            <a:endParaRPr lang="pt-BR" dirty="0"/>
+            <a:endParaRPr lang="pt-BR" dirty="0">
+              <a:solidFill>
+                <a:schemeClr val="tx1"/>
+              </a:solidFill>
+            </a:endParaRPr>
           </a:p>
         </p:txBody>
       </p:sp>
@@ -3708,6 +3830,12 @@
           <a:prstGeom prst="rect">
             <a:avLst/>
           </a:prstGeom>
+          <a:noFill/>
+          <a:ln>
+            <a:solidFill>
+              <a:schemeClr val="tx1"/>
+            </a:solidFill>
+          </a:ln>
         </p:spPr>
         <p:style>
           <a:lnRef idx="2">
@@ -3731,10 +3859,18 @@
           <a:p>
             <a:pPr algn="ctr"/>
             <a:r>
-              <a:rPr lang="pt-BR" dirty="0" smtClean="0"/>
+              <a:rPr lang="pt-BR" dirty="0" smtClean="0">
+                <a:solidFill>
+                  <a:schemeClr val="tx1"/>
+                </a:solidFill>
+              </a:rPr>
               <a:t>Câmera</a:t>
             </a:r>
-            <a:endParaRPr lang="pt-BR" dirty="0"/>
+            <a:endParaRPr lang="pt-BR" dirty="0">
+              <a:solidFill>
+                <a:schemeClr val="tx1"/>
+              </a:solidFill>
+            </a:endParaRPr>
           </a:p>
         </p:txBody>
       </p:sp>
@@ -3777,9 +3913,12 @@
           <a:prstGeom prst="rect">
             <a:avLst/>
           </a:prstGeom>
-          <a:solidFill>
-            <a:schemeClr val="bg1"/>
-          </a:solidFill>
+          <a:noFill/>
+          <a:ln>
+            <a:solidFill>
+              <a:schemeClr val="tx1"/>
+            </a:solidFill>
+          </a:ln>
         </p:spPr>
         <p:style>
           <a:lnRef idx="2">
@@ -3803,16 +3942,16 @@
           <a:p>
             <a:pPr algn="ctr"/>
             <a:r>
-              <a:rPr lang="pt-BR" dirty="0" smtClean="0">
+              <a:rPr lang="pt-BR" i="1" dirty="0" smtClean="0">
                 <a:solidFill>
-                  <a:schemeClr val="accent1"/>
+                  <a:schemeClr val="tx1"/>
                 </a:solidFill>
               </a:rPr>
               <a:t>Navegação</a:t>
             </a:r>
-            <a:endParaRPr lang="pt-BR" dirty="0">
+            <a:endParaRPr lang="pt-BR" i="1" dirty="0">
               <a:solidFill>
-                <a:schemeClr val="accent1"/>
+                <a:schemeClr val="tx1"/>
               </a:solidFill>
             </a:endParaRPr>
           </a:p>
@@ -3832,6 +3971,12 @@
           <a:prstGeom prst="rect">
             <a:avLst/>
           </a:prstGeom>
+          <a:noFill/>
+          <a:ln>
+            <a:solidFill>
+              <a:schemeClr val="tx1"/>
+            </a:solidFill>
+          </a:ln>
         </p:spPr>
         <p:style>
           <a:lnRef idx="2">
@@ -3855,17 +4000,29 @@
           <a:p>
             <a:pPr algn="ctr"/>
             <a:r>
-              <a:rPr lang="pt-BR" dirty="0" smtClean="0"/>
+              <a:rPr lang="pt-BR" dirty="0" smtClean="0">
+                <a:solidFill>
+                  <a:schemeClr val="tx1"/>
+                </a:solidFill>
+              </a:rPr>
               <a:t>Planejamento</a:t>
             </a:r>
           </a:p>
           <a:p>
             <a:pPr algn="ctr"/>
             <a:r>
-              <a:rPr lang="pt-BR" dirty="0" smtClean="0"/>
+              <a:rPr lang="pt-BR" dirty="0" smtClean="0">
+                <a:solidFill>
+                  <a:schemeClr val="tx1"/>
+                </a:solidFill>
+              </a:rPr>
               <a:t>Inter Mapas</a:t>
             </a:r>
-            <a:endParaRPr lang="pt-BR" dirty="0"/>
+            <a:endParaRPr lang="pt-BR" dirty="0">
+              <a:solidFill>
+                <a:schemeClr val="tx1"/>
+              </a:solidFill>
+            </a:endParaRPr>
           </a:p>
         </p:txBody>
       </p:sp>
@@ -3883,6 +4040,12 @@
           <a:prstGeom prst="rect">
             <a:avLst/>
           </a:prstGeom>
+          <a:noFill/>
+          <a:ln>
+            <a:solidFill>
+              <a:schemeClr val="tx1"/>
+            </a:solidFill>
+          </a:ln>
         </p:spPr>
         <p:style>
           <a:lnRef idx="2">
@@ -3906,10 +4069,18 @@
           <a:p>
             <a:pPr algn="ctr"/>
             <a:r>
-              <a:rPr lang="pt-BR" dirty="0" smtClean="0"/>
+              <a:rPr lang="pt-BR" dirty="0" smtClean="0">
+                <a:solidFill>
+                  <a:schemeClr val="tx1"/>
+                </a:solidFill>
+              </a:rPr>
               <a:t>Planejamento de Rota</a:t>
             </a:r>
-            <a:endParaRPr lang="pt-BR" dirty="0"/>
+            <a:endParaRPr lang="pt-BR" dirty="0">
+              <a:solidFill>
+                <a:schemeClr val="tx1"/>
+              </a:solidFill>
+            </a:endParaRPr>
           </a:p>
         </p:txBody>
       </p:sp>
@@ -3931,6 +4102,9 @@
             <a:avLst/>
           </a:prstGeom>
           <a:ln w="28575">
+            <a:solidFill>
+              <a:schemeClr val="tx1"/>
+            </a:solidFill>
             <a:tailEnd type="arrow"/>
           </a:ln>
         </p:spPr>
@@ -3963,6 +4137,12 @@
           <a:prstGeom prst="rect">
             <a:avLst/>
           </a:prstGeom>
+          <a:noFill/>
+          <a:ln>
+            <a:solidFill>
+              <a:schemeClr val="tx1"/>
+            </a:solidFill>
+          </a:ln>
         </p:spPr>
         <p:style>
           <a:lnRef idx="2">
@@ -3986,10 +4166,18 @@
           <a:p>
             <a:pPr algn="ctr"/>
             <a:r>
-              <a:rPr lang="pt-BR" dirty="0" smtClean="0"/>
+              <a:rPr lang="pt-BR" dirty="0" smtClean="0">
+                <a:solidFill>
+                  <a:schemeClr val="tx1"/>
+                </a:solidFill>
+              </a:rPr>
               <a:t>Executor</a:t>
             </a:r>
-            <a:endParaRPr lang="pt-BR" dirty="0"/>
+            <a:endParaRPr lang="pt-BR" dirty="0">
+              <a:solidFill>
+                <a:schemeClr val="tx1"/>
+              </a:solidFill>
+            </a:endParaRPr>
           </a:p>
         </p:txBody>
       </p:sp>
@@ -4008,6 +4196,9 @@
             <a:avLst/>
           </a:prstGeom>
           <a:ln w="28575">
+            <a:solidFill>
+              <a:schemeClr val="tx1"/>
+            </a:solidFill>
             <a:tailEnd type="arrow"/>
           </a:ln>
         </p:spPr>
@@ -4169,6 +4360,12 @@
             </a:avLst>
           </a:prstGeom>
           <a:ln w="19050">
+            <a:solidFill>
+              <a:schemeClr val="tx1">
+                <a:lumMod val="65000"/>
+                <a:lumOff val="35000"/>
+              </a:schemeClr>
+            </a:solidFill>
             <a:tailEnd type="arrow"/>
           </a:ln>
         </p:spPr>
@@ -4347,6 +4544,12 @@
             <a:avLst/>
           </a:prstGeom>
           <a:ln w="19050">
+            <a:solidFill>
+              <a:schemeClr val="tx1">
+                <a:lumMod val="65000"/>
+                <a:lumOff val="35000"/>
+              </a:schemeClr>
+            </a:solidFill>
             <a:tailEnd type="arrow"/>
           </a:ln>
         </p:spPr>
@@ -4383,6 +4586,12 @@
             <a:avLst/>
           </a:prstGeom>
           <a:ln w="19050">
+            <a:solidFill>
+              <a:schemeClr val="tx1">
+                <a:lumMod val="65000"/>
+                <a:lumOff val="35000"/>
+              </a:schemeClr>
+            </a:solidFill>
             <a:tailEnd type="arrow"/>
           </a:ln>
         </p:spPr>
@@ -4416,6 +4625,12 @@
             <a:avLst/>
           </a:prstGeom>
           <a:ln w="19050">
+            <a:solidFill>
+              <a:schemeClr val="tx1">
+                <a:lumMod val="65000"/>
+                <a:lumOff val="35000"/>
+              </a:schemeClr>
+            </a:solidFill>
             <a:tailEnd type="arrow"/>
           </a:ln>
         </p:spPr>
@@ -4782,6 +4997,12 @@
             <a:avLst/>
           </a:prstGeom>
           <a:ln w="19050">
+            <a:solidFill>
+              <a:schemeClr val="tx1">
+                <a:lumMod val="65000"/>
+                <a:lumOff val="35000"/>
+              </a:schemeClr>
+            </a:solidFill>
             <a:tailEnd type="arrow"/>
           </a:ln>
         </p:spPr>
@@ -4817,6 +5038,12 @@
             <a:avLst/>
           </a:prstGeom>
           <a:ln w="19050">
+            <a:solidFill>
+              <a:schemeClr val="tx1">
+                <a:lumMod val="65000"/>
+                <a:lumOff val="35000"/>
+              </a:schemeClr>
+            </a:solidFill>
             <a:tailEnd type="arrow"/>
           </a:ln>
         </p:spPr>
@@ -4850,6 +5077,12 @@
             <a:avLst/>
           </a:prstGeom>
           <a:ln w="19050">
+            <a:solidFill>
+              <a:schemeClr val="tx1">
+                <a:lumMod val="65000"/>
+                <a:lumOff val="35000"/>
+              </a:schemeClr>
+            </a:solidFill>
             <a:tailEnd type="arrow"/>
           </a:ln>
         </p:spPr>
@@ -4884,6 +5117,12 @@
           </a:prstGeom>
           <a:noFill/>
           <a:ln>
+            <a:solidFill>
+              <a:schemeClr val="tx1">
+                <a:lumMod val="65000"/>
+                <a:lumOff val="35000"/>
+              </a:schemeClr>
+            </a:solidFill>
             <a:prstDash val="sysDash"/>
           </a:ln>
         </p:spPr>

</xml_diff>